<commit_message>
Update Social Engineering - A Chained, Potent attack vector.pptx
</commit_message>
<xml_diff>
--- a/Social Engineering - A Chained, Potent attack vector.pptx
+++ b/Social Engineering - A Chained, Potent attack vector.pptx
@@ -7,10 +7,10 @@
     <p:sldMasterId id="2147483686" r:id="rId3"/>
   </p:sldMasterIdLst>
   <p:notesMasterIdLst>
-    <p:notesMasterId r:id="rId16"/>
+    <p:notesMasterId r:id="rId17"/>
   </p:notesMasterIdLst>
   <p:handoutMasterIdLst>
-    <p:handoutMasterId r:id="rId17"/>
+    <p:handoutMasterId r:id="rId18"/>
   </p:handoutMasterIdLst>
   <p:sldIdLst>
     <p:sldId id="277" r:id="rId4"/>
@@ -24,7 +24,8 @@
     <p:sldId id="266" r:id="rId12"/>
     <p:sldId id="267" r:id="rId13"/>
     <p:sldId id="425" r:id="rId14"/>
-    <p:sldId id="431" r:id="rId15"/>
+    <p:sldId id="432" r:id="rId15"/>
+    <p:sldId id="431" r:id="rId16"/>
   </p:sldIdLst>
   <p:sldSz cx="12192000" cy="6858000"/>
   <p:notesSz cx="6858000" cy="9144000"/>
@@ -1047,6 +1048,151 @@
 </p:notes>
 </file>
 
+<file path=ppt/notesSlides/notesSlide4.xml><?xml version="1.0" encoding="utf-8"?>
+<p:notes xmlns:a="http://schemas.openxmlformats.org/drawingml/2006/main" xmlns:r="http://schemas.openxmlformats.org/officeDocument/2006/relationships" xmlns:p="http://schemas.openxmlformats.org/presentationml/2006/main" showMasterSp="0" showMasterPhAnim="0">
+  <p:cSld>
+    <p:spTree>
+      <p:nvGrpSpPr>
+        <p:cNvPr id="1" name="Shape 168">
+          <a:extLst>
+            <a:ext uri="{FF2B5EF4-FFF2-40B4-BE49-F238E27FC236}">
+              <a16:creationId xmlns:a16="http://schemas.microsoft.com/office/drawing/2014/main" id="{937B4759-1827-D4C7-EEE6-72893EA211DB}"/>
+            </a:ext>
+          </a:extLst>
+        </p:cNvPr>
+        <p:cNvGrpSpPr/>
+        <p:nvPr/>
+      </p:nvGrpSpPr>
+      <p:grpSpPr>
+        <a:xfrm>
+          <a:off x="0" y="0"/>
+          <a:ext cx="0" cy="0"/>
+          <a:chOff x="0" y="0"/>
+          <a:chExt cx="0" cy="0"/>
+        </a:xfrm>
+      </p:grpSpPr>
+      <p:sp>
+        <p:nvSpPr>
+          <p:cNvPr id="169" name="Google Shape;169;p57:notes">
+            <a:extLst>
+              <a:ext uri="{FF2B5EF4-FFF2-40B4-BE49-F238E27FC236}">
+                <a16:creationId xmlns:a16="http://schemas.microsoft.com/office/drawing/2014/main" id="{9160E44D-DDC1-3BC8-F72A-5C1B1C608B5B}"/>
+              </a:ext>
+            </a:extLst>
+          </p:cNvPr>
+          <p:cNvSpPr txBox="1">
+            <a:spLocks noGrp="1"/>
+          </p:cNvSpPr>
+          <p:nvPr>
+            <p:ph type="body" idx="1"/>
+          </p:nvPr>
+        </p:nvSpPr>
+        <p:spPr>
+          <a:xfrm>
+            <a:off x="685800" y="4400550"/>
+            <a:ext cx="5486400" cy="3600450"/>
+          </a:xfrm>
+          <a:prstGeom prst="rect">
+            <a:avLst/>
+          </a:prstGeom>
+          <a:noFill/>
+          <a:ln>
+            <a:noFill/>
+          </a:ln>
+        </p:spPr>
+        <p:txBody>
+          <a:bodyPr spcFirstLastPara="1" wrap="square" lIns="91425" tIns="45700" rIns="91425" bIns="45700" anchor="t" anchorCtr="0">
+            <a:noAutofit/>
+          </a:bodyPr>
+          <a:lstStyle/>
+          <a:p>
+            <a:pPr marL="0" lvl="0" indent="0" algn="l" rtl="0">
+              <a:lnSpc>
+                <a:spcPct val="100000"/>
+              </a:lnSpc>
+              <a:spcBef>
+                <a:spcPts val="0"/>
+              </a:spcBef>
+              <a:spcAft>
+                <a:spcPts val="0"/>
+              </a:spcAft>
+              <a:buSzPts val="1400"/>
+              <a:buNone/>
+            </a:pPr>
+            <a:endParaRPr/>
+          </a:p>
+        </p:txBody>
+      </p:sp>
+      <p:sp>
+        <p:nvSpPr>
+          <p:cNvPr id="170" name="Google Shape;170;p57:notes">
+            <a:extLst>
+              <a:ext uri="{FF2B5EF4-FFF2-40B4-BE49-F238E27FC236}">
+                <a16:creationId xmlns:a16="http://schemas.microsoft.com/office/drawing/2014/main" id="{9C1B7E6F-217F-1FD9-B2C6-89ADED7171C6}"/>
+              </a:ext>
+            </a:extLst>
+          </p:cNvPr>
+          <p:cNvSpPr>
+            <a:spLocks noGrp="1" noRot="1" noChangeAspect="1"/>
+          </p:cNvSpPr>
+          <p:nvPr>
+            <p:ph type="sldImg" idx="2"/>
+          </p:nvPr>
+        </p:nvSpPr>
+        <p:spPr>
+          <a:xfrm>
+            <a:off x="685800" y="1143000"/>
+            <a:ext cx="5486400" cy="3086100"/>
+          </a:xfrm>
+          <a:custGeom>
+            <a:avLst/>
+            <a:gdLst/>
+            <a:ahLst/>
+            <a:cxnLst/>
+            <a:rect l="l" t="t" r="r" b="b"/>
+            <a:pathLst>
+              <a:path w="120000" h="120000" extrusionOk="0">
+                <a:moveTo>
+                  <a:pt x="0" y="0"/>
+                </a:moveTo>
+                <a:lnTo>
+                  <a:pt x="120000" y="0"/>
+                </a:lnTo>
+                <a:lnTo>
+                  <a:pt x="120000" y="120000"/>
+                </a:lnTo>
+                <a:lnTo>
+                  <a:pt x="0" y="120000"/>
+                </a:lnTo>
+                <a:close/>
+              </a:path>
+            </a:pathLst>
+          </a:custGeom>
+          <a:noFill/>
+          <a:ln w="12700" cap="flat" cmpd="sng">
+            <a:solidFill>
+              <a:srgbClr val="000000"/>
+            </a:solidFill>
+            <a:prstDash val="solid"/>
+            <a:round/>
+            <a:headEnd type="none" w="sm" len="sm"/>
+            <a:tailEnd type="none" w="sm" len="sm"/>
+          </a:ln>
+        </p:spPr>
+      </p:sp>
+    </p:spTree>
+    <p:extLst>
+      <p:ext uri="{BB962C8B-B14F-4D97-AF65-F5344CB8AC3E}">
+        <p14:creationId xmlns:p14="http://schemas.microsoft.com/office/powerpoint/2010/main" val="4235607080"/>
+      </p:ext>
+    </p:extLst>
+  </p:cSld>
+  <p:clrMapOvr>
+    <a:masterClrMapping/>
+  </p:clrMapOvr>
+</p:notes>
+</file>
+
 <file path=ppt/slideLayouts/slideLayout1.xml><?xml version="1.0" encoding="utf-8"?>
 <p:sldLayout xmlns:a="http://schemas.openxmlformats.org/drawingml/2006/main" xmlns:r="http://schemas.openxmlformats.org/officeDocument/2006/relationships" xmlns:p="http://schemas.openxmlformats.org/presentationml/2006/main" type="title" preserve="1">
   <p:cSld name="Title Slide">
@@ -8592,7 +8738,7 @@
           <a:noFill/>
           <a:extLst>
             <a:ext uri="{909E8E84-426E-40dd-AFC4-6F175D3DCCD1}">
-              <a14:hiddenFill xmlns:a14="http://schemas.microsoft.com/office/drawing/2010/main" xmlns="">
+              <a14:hiddenFill xmlns="" xmlns:a14="http://schemas.microsoft.com/office/drawing/2010/main">
                 <a:solidFill>
                   <a:srgbClr val="FFFFFF"/>
                 </a:solidFill>
@@ -8633,7 +8779,7 @@
           <a:noFill/>
           <a:extLst>
             <a:ext uri="{909E8E84-426E-40dd-AFC4-6F175D3DCCD1}">
-              <a14:hiddenFill xmlns:a14="http://schemas.microsoft.com/office/drawing/2010/main" xmlns="">
+              <a14:hiddenFill xmlns="" xmlns:a14="http://schemas.microsoft.com/office/drawing/2010/main">
                 <a:solidFill>
                   <a:srgbClr val="FFFFFF"/>
                 </a:solidFill>
@@ -8674,7 +8820,7 @@
           <a:noFill/>
           <a:extLst>
             <a:ext uri="{909E8E84-426E-40dd-AFC4-6F175D3DCCD1}">
-              <a14:hiddenFill xmlns:a14="http://schemas.microsoft.com/office/drawing/2010/main" xmlns="">
+              <a14:hiddenFill xmlns="" xmlns:a14="http://schemas.microsoft.com/office/drawing/2010/main">
                 <a:solidFill>
                   <a:srgbClr val="FFFFFF"/>
                 </a:solidFill>
@@ -12698,14 +12844,14 @@
           </a:ln>
           <a:extLst>
             <a:ext uri="{909E8E84-426E-40dd-AFC4-6F175D3DCCD1}">
-              <a14:hiddenFill xmlns="" xmlns:a14="http://schemas.microsoft.com/office/drawing/2010/main">
+              <a14:hiddenFill xmlns:a14="http://schemas.microsoft.com/office/drawing/2010/main" xmlns="">
                 <a:solidFill>
                   <a:srgbClr val="FFFFFF"/>
                 </a:solidFill>
               </a14:hiddenFill>
             </a:ext>
             <a:ext uri="{91240B29-F687-4f45-9708-019B960494DF}">
-              <a14:hiddenLine xmlns="" xmlns:a14="http://schemas.microsoft.com/office/drawing/2010/main" w="9525">
+              <a14:hiddenLine xmlns:a14="http://schemas.microsoft.com/office/drawing/2010/main" xmlns="" w="9525">
                 <a:solidFill>
                   <a:srgbClr val="000000"/>
                 </a:solidFill>
@@ -12942,14 +13088,14 @@
           </a:ln>
           <a:extLst>
             <a:ext uri="{909E8E84-426E-40dd-AFC4-6F175D3DCCD1}">
-              <a14:hiddenFill xmlns="" xmlns:a14="http://schemas.microsoft.com/office/drawing/2010/main">
+              <a14:hiddenFill xmlns:a14="http://schemas.microsoft.com/office/drawing/2010/main" xmlns="">
                 <a:solidFill>
                   <a:srgbClr val="FFFFFF"/>
                 </a:solidFill>
               </a14:hiddenFill>
             </a:ext>
             <a:ext uri="{91240B29-F687-4f45-9708-019B960494DF}">
-              <a14:hiddenLine xmlns="" xmlns:a14="http://schemas.microsoft.com/office/drawing/2010/main" w="9525">
+              <a14:hiddenLine xmlns:a14="http://schemas.microsoft.com/office/drawing/2010/main" xmlns="" w="9525">
                 <a:solidFill>
                   <a:srgbClr val="000000"/>
                 </a:solidFill>
@@ -13116,14 +13262,14 @@
           </a:ln>
           <a:extLst>
             <a:ext uri="{909E8E84-426E-40dd-AFC4-6F175D3DCCD1}">
-              <a14:hiddenFill xmlns="" xmlns:a14="http://schemas.microsoft.com/office/drawing/2010/main">
+              <a14:hiddenFill xmlns:a14="http://schemas.microsoft.com/office/drawing/2010/main" xmlns="">
                 <a:solidFill>
                   <a:srgbClr val="FFFFFF"/>
                 </a:solidFill>
               </a14:hiddenFill>
             </a:ext>
             <a:ext uri="{91240B29-F687-4f45-9708-019B960494DF}">
-              <a14:hiddenLine xmlns="" xmlns:a14="http://schemas.microsoft.com/office/drawing/2010/main" w="9525">
+              <a14:hiddenLine xmlns:a14="http://schemas.microsoft.com/office/drawing/2010/main" xmlns="" w="9525">
                 <a:solidFill>
                   <a:srgbClr val="000000"/>
                 </a:solidFill>
@@ -13745,6 +13891,11 @@
           <a:prstGeom prst="rect">
             <a:avLst/>
           </a:prstGeom>
+          <a:ln>
+            <a:solidFill>
+              <a:schemeClr val="tx1"/>
+            </a:solidFill>
+          </a:ln>
         </p:spPr>
       </p:pic>
     </p:spTree>
@@ -13910,6 +14061,11 @@
           <a:prstGeom prst="rect">
             <a:avLst/>
           </a:prstGeom>
+          <a:ln>
+            <a:solidFill>
+              <a:schemeClr val="tx1"/>
+            </a:solidFill>
+          </a:ln>
         </p:spPr>
       </p:pic>
     </p:spTree>
@@ -13930,6 +14086,299 @@
   <p:cSld>
     <p:spTree>
       <p:nvGrpSpPr>
+        <p:cNvPr id="1" name="Shape 171">
+          <a:extLst>
+            <a:ext uri="{FF2B5EF4-FFF2-40B4-BE49-F238E27FC236}">
+              <a16:creationId xmlns:a16="http://schemas.microsoft.com/office/drawing/2014/main" id="{F47015C2-3BC2-53BE-71FB-2119FEF69C0D}"/>
+            </a:ext>
+          </a:extLst>
+        </p:cNvPr>
+        <p:cNvGrpSpPr/>
+        <p:nvPr/>
+      </p:nvGrpSpPr>
+      <p:grpSpPr>
+        <a:xfrm>
+          <a:off x="0" y="0"/>
+          <a:ext cx="0" cy="0"/>
+          <a:chOff x="0" y="0"/>
+          <a:chExt cx="0" cy="0"/>
+        </a:xfrm>
+      </p:grpSpPr>
+      <p:sp>
+        <p:nvSpPr>
+          <p:cNvPr id="172" name="Google Shape;172;p57">
+            <a:extLst>
+              <a:ext uri="{FF2B5EF4-FFF2-40B4-BE49-F238E27FC236}">
+                <a16:creationId xmlns:a16="http://schemas.microsoft.com/office/drawing/2014/main" id="{0C90DD07-1E2F-E58C-4601-56700709E745}"/>
+              </a:ext>
+            </a:extLst>
+          </p:cNvPr>
+          <p:cNvSpPr txBox="1">
+            <a:spLocks noGrp="1"/>
+          </p:cNvSpPr>
+          <p:nvPr>
+            <p:ph type="title"/>
+          </p:nvPr>
+        </p:nvSpPr>
+        <p:spPr>
+          <a:xfrm>
+            <a:off x="770021" y="124908"/>
+            <a:ext cx="10515600" cy="1325563"/>
+          </a:xfrm>
+          <a:prstGeom prst="rect">
+            <a:avLst/>
+          </a:prstGeom>
+          <a:noFill/>
+          <a:ln>
+            <a:noFill/>
+          </a:ln>
+        </p:spPr>
+        <p:txBody>
+          <a:bodyPr spcFirstLastPara="1" wrap="square" lIns="91425" tIns="45700" rIns="91425" bIns="45700" anchor="ctr" anchorCtr="0">
+            <a:normAutofit/>
+          </a:bodyPr>
+          <a:lstStyle/>
+          <a:p>
+            <a:pPr marL="0" lvl="0" indent="0" algn="l" rtl="0">
+              <a:lnSpc>
+                <a:spcPct val="90000"/>
+              </a:lnSpc>
+              <a:spcBef>
+                <a:spcPts val="0"/>
+              </a:spcBef>
+              <a:spcAft>
+                <a:spcPts val="0"/>
+              </a:spcAft>
+              <a:buClr>
+                <a:schemeClr val="dk1"/>
+              </a:buClr>
+              <a:buSzPts val="4400"/>
+              <a:buFont typeface="Calibri"/>
+              <a:buNone/>
+            </a:pPr>
+            <a:r>
+              <a:rPr lang="en-US" dirty="0"/>
+              <a:t>Results and Outputs</a:t>
+            </a:r>
+            <a:endParaRPr dirty="0"/>
+          </a:p>
+        </p:txBody>
+      </p:sp>
+      <p:sp>
+        <p:nvSpPr>
+          <p:cNvPr id="173" name="Google Shape;173;p57">
+            <a:extLst>
+              <a:ext uri="{FF2B5EF4-FFF2-40B4-BE49-F238E27FC236}">
+                <a16:creationId xmlns:a16="http://schemas.microsoft.com/office/drawing/2014/main" id="{34ED2DC2-6E90-89DC-4CA6-FA88065D6047}"/>
+              </a:ext>
+            </a:extLst>
+          </p:cNvPr>
+          <p:cNvSpPr txBox="1">
+            <a:spLocks noGrp="1"/>
+          </p:cNvSpPr>
+          <p:nvPr>
+            <p:ph type="body" idx="1"/>
+          </p:nvPr>
+        </p:nvSpPr>
+        <p:spPr>
+          <a:xfrm>
+            <a:off x="59991" y="1210294"/>
+            <a:ext cx="6027820" cy="5425239"/>
+          </a:xfrm>
+          <a:prstGeom prst="rect">
+            <a:avLst/>
+          </a:prstGeom>
+          <a:noFill/>
+          <a:ln>
+            <a:noFill/>
+          </a:ln>
+        </p:spPr>
+        <p:txBody>
+          <a:bodyPr spcFirstLastPara="1" wrap="square" lIns="91425" tIns="45700" rIns="91425" bIns="45700" anchor="t" anchorCtr="0">
+            <a:normAutofit/>
+          </a:bodyPr>
+          <a:lstStyle/>
+          <a:p>
+            <a:pPr marL="228600" lvl="0" indent="-228600" algn="l" rtl="0">
+              <a:lnSpc>
+                <a:spcPct val="90000"/>
+              </a:lnSpc>
+              <a:spcBef>
+                <a:spcPts val="0"/>
+              </a:spcBef>
+              <a:spcAft>
+                <a:spcPts val="0"/>
+              </a:spcAft>
+              <a:buClr>
+                <a:schemeClr val="dk1"/>
+              </a:buClr>
+              <a:buSzPts val="2800"/>
+              <a:buChar char="•"/>
+            </a:pPr>
+            <a:r>
+              <a:rPr lang="en-IN" dirty="0"/>
+              <a:t>Logger in Action on both client and server side</a:t>
+            </a:r>
+            <a:endParaRPr dirty="0"/>
+          </a:p>
+        </p:txBody>
+      </p:sp>
+      <p:sp>
+        <p:nvSpPr>
+          <p:cNvPr id="174" name="Google Shape;174;p57">
+            <a:extLst>
+              <a:ext uri="{FF2B5EF4-FFF2-40B4-BE49-F238E27FC236}">
+                <a16:creationId xmlns:a16="http://schemas.microsoft.com/office/drawing/2014/main" id="{0B3B15C2-5243-F313-04AC-46AF6535A10A}"/>
+              </a:ext>
+            </a:extLst>
+          </p:cNvPr>
+          <p:cNvSpPr txBox="1">
+            <a:spLocks noGrp="1"/>
+          </p:cNvSpPr>
+          <p:nvPr>
+            <p:ph type="sldNum" idx="12"/>
+          </p:nvPr>
+        </p:nvSpPr>
+        <p:spPr>
+          <a:xfrm>
+            <a:off x="8610600" y="6356350"/>
+            <a:ext cx="2743200" cy="365125"/>
+          </a:xfrm>
+          <a:prstGeom prst="rect">
+            <a:avLst/>
+          </a:prstGeom>
+          <a:noFill/>
+          <a:ln>
+            <a:noFill/>
+          </a:ln>
+        </p:spPr>
+        <p:txBody>
+          <a:bodyPr spcFirstLastPara="1" wrap="square" lIns="91425" tIns="45700" rIns="91425" bIns="45700" anchor="ctr" anchorCtr="0">
+            <a:noAutofit/>
+          </a:bodyPr>
+          <a:lstStyle/>
+          <a:p>
+            <a:pPr marL="0" lvl="0" indent="0" algn="r" rtl="0">
+              <a:lnSpc>
+                <a:spcPct val="100000"/>
+              </a:lnSpc>
+              <a:spcBef>
+                <a:spcPts val="0"/>
+              </a:spcBef>
+              <a:spcAft>
+                <a:spcPts val="0"/>
+              </a:spcAft>
+              <a:buSzPts val="1200"/>
+              <a:buNone/>
+            </a:pPr>
+            <a:fld id="{00000000-1234-1234-1234-123412341234}" type="slidenum">
+              <a:rPr lang="en-US" smtClean="0"/>
+              <a:t>12</a:t>
+            </a:fld>
+            <a:endParaRPr dirty="0"/>
+          </a:p>
+        </p:txBody>
+      </p:sp>
+      <p:pic>
+        <p:nvPicPr>
+          <p:cNvPr id="3" name="Picture 2">
+            <a:extLst>
+              <a:ext uri="{FF2B5EF4-FFF2-40B4-BE49-F238E27FC236}">
+                <a16:creationId xmlns:a16="http://schemas.microsoft.com/office/drawing/2014/main" id="{352EA254-66AA-EA77-9DCE-614C731006FD}"/>
+              </a:ext>
+            </a:extLst>
+          </p:cNvPr>
+          <p:cNvPicPr>
+            <a:picLocks noChangeAspect="1"/>
+          </p:cNvPicPr>
+          <p:nvPr/>
+        </p:nvPicPr>
+        <p:blipFill>
+          <a:blip r:embed="rId3">
+            <a:extLst>
+              <a:ext uri="{28A0092B-C50C-407E-A947-70E740481C1C}">
+                <a14:useLocalDpi xmlns:a14="http://schemas.microsoft.com/office/drawing/2010/main" val="0"/>
+              </a:ext>
+            </a:extLst>
+          </a:blip>
+          <a:stretch>
+            <a:fillRect/>
+          </a:stretch>
+        </p:blipFill>
+        <p:spPr>
+          <a:xfrm>
+            <a:off x="6912428" y="318654"/>
+            <a:ext cx="4593771" cy="1983674"/>
+          </a:xfrm>
+          <a:prstGeom prst="rect">
+            <a:avLst/>
+          </a:prstGeom>
+          <a:ln>
+            <a:solidFill>
+              <a:schemeClr val="tx1"/>
+            </a:solidFill>
+          </a:ln>
+        </p:spPr>
+      </p:pic>
+      <p:pic>
+        <p:nvPicPr>
+          <p:cNvPr id="5" name="Picture 4">
+            <a:extLst>
+              <a:ext uri="{FF2B5EF4-FFF2-40B4-BE49-F238E27FC236}">
+                <a16:creationId xmlns:a16="http://schemas.microsoft.com/office/drawing/2014/main" id="{4AEC2BB8-3F32-ACEF-7DBA-422745943671}"/>
+              </a:ext>
+            </a:extLst>
+          </p:cNvPr>
+          <p:cNvPicPr>
+            <a:picLocks noChangeAspect="1"/>
+          </p:cNvPicPr>
+          <p:nvPr/>
+        </p:nvPicPr>
+        <p:blipFill>
+          <a:blip r:embed="rId4">
+            <a:extLst>
+              <a:ext uri="{28A0092B-C50C-407E-A947-70E740481C1C}">
+                <a14:useLocalDpi xmlns:a14="http://schemas.microsoft.com/office/drawing/2010/main" val="0"/>
+              </a:ext>
+            </a:extLst>
+          </a:blip>
+          <a:stretch>
+            <a:fillRect/>
+          </a:stretch>
+        </p:blipFill>
+        <p:spPr>
+          <a:xfrm>
+            <a:off x="4049484" y="2696187"/>
+            <a:ext cx="7724775" cy="3266303"/>
+          </a:xfrm>
+          <a:prstGeom prst="rect">
+            <a:avLst/>
+          </a:prstGeom>
+          <a:ln>
+            <a:solidFill>
+              <a:schemeClr val="tx1"/>
+            </a:solidFill>
+          </a:ln>
+        </p:spPr>
+      </p:pic>
+    </p:spTree>
+    <p:extLst>
+      <p:ext uri="{BB962C8B-B14F-4D97-AF65-F5344CB8AC3E}">
+        <p14:creationId xmlns:p14="http://schemas.microsoft.com/office/powerpoint/2010/main" val="1272091931"/>
+      </p:ext>
+    </p:extLst>
+  </p:cSld>
+  <p:clrMapOvr>
+    <a:masterClrMapping/>
+  </p:clrMapOvr>
+</p:sld>
+</file>
+
+<file path=ppt/slides/slide13.xml><?xml version="1.0" encoding="utf-8"?>
+<p:sld xmlns:a="http://schemas.openxmlformats.org/drawingml/2006/main" xmlns:r="http://schemas.openxmlformats.org/officeDocument/2006/relationships" xmlns:p="http://schemas.openxmlformats.org/presentationml/2006/main">
+  <p:cSld>
+    <p:spTree>
+      <p:nvGrpSpPr>
         <p:cNvPr id="1" name=""/>
         <p:cNvGrpSpPr/>
         <p:nvPr/>
@@ -14167,7 +14616,7 @@
             <a:fld id="{BDCDBBEF-AA6C-4BA6-85B2-A17D7F280E38}" type="slidenum">
               <a:rPr lang="en-US" smtClean="0"/>
               <a:pPr/>
-              <a:t>12</a:t>
+              <a:t>13</a:t>
             </a:fld>
             <a:endParaRPr lang="en-US"/>
           </a:p>
@@ -18504,6 +18953,11 @@
           <a:prstGeom prst="rect">
             <a:avLst/>
           </a:prstGeom>
+          <a:ln>
+            <a:solidFill>
+              <a:schemeClr val="tx1"/>
+            </a:solidFill>
+          </a:ln>
         </p:spPr>
       </p:pic>
     </p:spTree>

</xml_diff>